<commit_message>
Deleted useless slides from the presentation
</commit_message>
<xml_diff>
--- a/Docs/Presentation.pptx
+++ b/Docs/Presentation.pptx
@@ -6,11 +6,10 @@
   </p:sldMasterIdLst>
   <p:sldIdLst>
     <p:sldId id="256" r:id="rId2"/>
-    <p:sldId id="257" r:id="rId3"/>
-    <p:sldId id="258" r:id="rId4"/>
-    <p:sldId id="259" r:id="rId5"/>
-    <p:sldId id="260" r:id="rId6"/>
-    <p:sldId id="262" r:id="rId7"/>
+    <p:sldId id="258" r:id="rId3"/>
+    <p:sldId id="259" r:id="rId4"/>
+    <p:sldId id="260" r:id="rId5"/>
+    <p:sldId id="262" r:id="rId6"/>
   </p:sldIdLst>
   <p:sldSz cx="12192000" cy="6858000"/>
   <p:notesSz cx="6858000" cy="9144000"/>
@@ -193,7 +192,7 @@
           </a:lstStyle>
           <a:p>
             <a:r>
-              <a:rPr lang="en-US" smtClean="0"/>
+              <a:rPr lang="en-US"/>
               <a:t>Click to edit Master title style</a:t>
             </a:r>
             <a:endParaRPr lang="en-US" dirty="0"/>
@@ -289,7 +288,7 @@
           </a:lstStyle>
           <a:p>
             <a:r>
-              <a:rPr lang="en-US" smtClean="0"/>
+              <a:rPr lang="en-US"/>
               <a:t>Click to edit Master subtitle style</a:t>
             </a:r>
             <a:endParaRPr lang="en-US" dirty="0"/>
@@ -416,7 +415,7 @@
           </a:lstStyle>
           <a:p>
             <a:r>
-              <a:rPr lang="en-US" smtClean="0"/>
+              <a:rPr lang="en-US"/>
               <a:t>Click to edit Master title style</a:t>
             </a:r>
             <a:endParaRPr lang="en-US" dirty="0"/>
@@ -481,7 +480,7 @@
           </a:lstStyle>
           <a:p>
             <a:r>
-              <a:rPr lang="en-US" smtClean="0"/>
+              <a:rPr lang="en-US"/>
               <a:t>Click icon to add picture</a:t>
             </a:r>
             <a:endParaRPr lang="en-US" dirty="0"/>
@@ -571,7 +570,7 @@
           <a:p>
             <a:pPr lvl="0"/>
             <a:r>
-              <a:rPr lang="en-US" smtClean="0"/>
+              <a:rPr lang="en-US"/>
               <a:t>Edit Master text styles</a:t>
             </a:r>
           </a:p>
@@ -697,7 +696,7 @@
           </a:lstStyle>
           <a:p>
             <a:r>
-              <a:rPr lang="en-US" smtClean="0"/>
+              <a:rPr lang="en-US"/>
               <a:t>Click to edit Master title style</a:t>
             </a:r>
             <a:endParaRPr lang="en-US" dirty="0"/>
@@ -763,7 +762,7 @@
           <a:p>
             <a:pPr lvl="0"/>
             <a:r>
-              <a:rPr lang="en-US" smtClean="0"/>
+              <a:rPr lang="en-US"/>
               <a:t>Edit Master text styles</a:t>
             </a:r>
           </a:p>
@@ -889,7 +888,7 @@
           </a:lstStyle>
           <a:p>
             <a:r>
-              <a:rPr lang="en-US" smtClean="0"/>
+              <a:rPr lang="en-US"/>
               <a:t>Click to edit Master title style</a:t>
             </a:r>
             <a:endParaRPr lang="en-US" dirty="0"/>
@@ -957,7 +956,7 @@
           <a:p>
             <a:pPr lvl="0"/>
             <a:r>
-              <a:rPr lang="en-US" smtClean="0"/>
+              <a:rPr lang="en-US"/>
               <a:t>Edit Master text styles</a:t>
             </a:r>
           </a:p>
@@ -1024,7 +1023,7 @@
           <a:p>
             <a:pPr lvl="0"/>
             <a:r>
-              <a:rPr lang="en-US" smtClean="0"/>
+              <a:rPr lang="en-US"/>
               <a:t>Edit Master text styles</a:t>
             </a:r>
           </a:p>
@@ -1384,7 +1383,7 @@
           </a:lstStyle>
           <a:p>
             <a:r>
-              <a:rPr lang="en-US" smtClean="0"/>
+              <a:rPr lang="en-US"/>
               <a:t>Click to edit Master title style</a:t>
             </a:r>
             <a:endParaRPr lang="en-US" dirty="0"/>
@@ -1450,7 +1449,7 @@
           <a:p>
             <a:pPr lvl="0"/>
             <a:r>
-              <a:rPr lang="en-US" smtClean="0"/>
+              <a:rPr lang="en-US"/>
               <a:t>Edit Master text styles</a:t>
             </a:r>
           </a:p>
@@ -1572,7 +1571,7 @@
           <a:lstStyle/>
           <a:p>
             <a:r>
-              <a:rPr lang="en-US" smtClean="0"/>
+              <a:rPr lang="en-US"/>
               <a:t>Click to edit Master title style</a:t>
             </a:r>
             <a:endParaRPr lang="en-US" dirty="0"/>
@@ -1667,7 +1666,7 @@
           <a:p>
             <a:pPr lvl="0"/>
             <a:r>
-              <a:rPr lang="en-US" smtClean="0"/>
+              <a:rPr lang="en-US"/>
               <a:t>Edit Master text styles</a:t>
             </a:r>
           </a:p>
@@ -1734,7 +1733,7 @@
           <a:p>
             <a:pPr lvl="0"/>
             <a:r>
-              <a:rPr lang="en-US" smtClean="0"/>
+              <a:rPr lang="en-US"/>
               <a:t>Edit Master text styles</a:t>
             </a:r>
           </a:p>
@@ -1798,7 +1797,7 @@
               <a:buNone/>
             </a:pPr>
             <a:r>
-              <a:rPr lang="en-US" smtClean="0"/>
+              <a:rPr lang="en-US"/>
               <a:t>Edit Master text styles</a:t>
             </a:r>
           </a:p>
@@ -1865,7 +1864,7 @@
           <a:p>
             <a:pPr lvl="0"/>
             <a:r>
-              <a:rPr lang="en-US" smtClean="0"/>
+              <a:rPr lang="en-US"/>
               <a:t>Edit Master text styles</a:t>
             </a:r>
           </a:p>
@@ -1929,7 +1928,7 @@
               <a:buNone/>
             </a:pPr>
             <a:r>
-              <a:rPr lang="en-US" smtClean="0"/>
+              <a:rPr lang="en-US"/>
               <a:t>Edit Master text styles</a:t>
             </a:r>
           </a:p>
@@ -1996,7 +1995,7 @@
           <a:p>
             <a:pPr lvl="0"/>
             <a:r>
-              <a:rPr lang="en-US" smtClean="0"/>
+              <a:rPr lang="en-US"/>
               <a:t>Edit Master text styles</a:t>
             </a:r>
           </a:p>
@@ -2118,7 +2117,7 @@
           <a:lstStyle/>
           <a:p>
             <a:r>
-              <a:rPr lang="en-US" smtClean="0"/>
+              <a:rPr lang="en-US"/>
               <a:t>Click to edit Master title style</a:t>
             </a:r>
             <a:endParaRPr lang="en-US" dirty="0"/>
@@ -2209,7 +2208,7 @@
           <a:p>
             <a:pPr lvl="0"/>
             <a:r>
-              <a:rPr lang="en-US" smtClean="0"/>
+              <a:rPr lang="en-US"/>
               <a:t>Edit Master text styles</a:t>
             </a:r>
           </a:p>
@@ -2287,7 +2286,7 @@
           </a:lstStyle>
           <a:p>
             <a:r>
-              <a:rPr lang="en-US" smtClean="0"/>
+              <a:rPr lang="en-US"/>
               <a:t>Click icon to add picture</a:t>
             </a:r>
             <a:endParaRPr lang="en-US" dirty="0"/>
@@ -2355,7 +2354,7 @@
           <a:p>
             <a:pPr lvl="0"/>
             <a:r>
-              <a:rPr lang="en-US" smtClean="0"/>
+              <a:rPr lang="en-US"/>
               <a:t>Edit Master text styles</a:t>
             </a:r>
           </a:p>
@@ -2445,7 +2444,7 @@
           <a:p>
             <a:pPr lvl="0"/>
             <a:r>
-              <a:rPr lang="en-US" smtClean="0"/>
+              <a:rPr lang="en-US"/>
               <a:t>Edit Master text styles</a:t>
             </a:r>
           </a:p>
@@ -2523,7 +2522,7 @@
           </a:lstStyle>
           <a:p>
             <a:r>
-              <a:rPr lang="en-US" smtClean="0"/>
+              <a:rPr lang="en-US"/>
               <a:t>Click icon to add picture</a:t>
             </a:r>
             <a:endParaRPr lang="en-US" dirty="0"/>
@@ -2591,7 +2590,7 @@
           <a:p>
             <a:pPr lvl="0"/>
             <a:r>
-              <a:rPr lang="en-US" smtClean="0"/>
+              <a:rPr lang="en-US"/>
               <a:t>Edit Master text styles</a:t>
             </a:r>
           </a:p>
@@ -2681,7 +2680,7 @@
           <a:p>
             <a:pPr lvl="0"/>
             <a:r>
-              <a:rPr lang="en-US" smtClean="0"/>
+              <a:rPr lang="en-US"/>
               <a:t>Edit Master text styles</a:t>
             </a:r>
           </a:p>
@@ -2759,7 +2758,7 @@
           </a:lstStyle>
           <a:p>
             <a:r>
-              <a:rPr lang="en-US" smtClean="0"/>
+              <a:rPr lang="en-US"/>
               <a:t>Click icon to add picture</a:t>
             </a:r>
             <a:endParaRPr lang="en-US" dirty="0"/>
@@ -2827,7 +2826,7 @@
           <a:p>
             <a:pPr lvl="0"/>
             <a:r>
-              <a:rPr lang="en-US" smtClean="0"/>
+              <a:rPr lang="en-US"/>
               <a:t>Edit Master text styles</a:t>
             </a:r>
           </a:p>
@@ -2944,7 +2943,7 @@
           <a:lstStyle/>
           <a:p>
             <a:r>
-              <a:rPr lang="en-US" smtClean="0"/>
+              <a:rPr lang="en-US"/>
               <a:t>Click to edit Master title style</a:t>
             </a:r>
             <a:endParaRPr lang="en-US" dirty="0"/>
@@ -2968,35 +2967,35 @@
           <a:p>
             <a:pPr lvl="0"/>
             <a:r>
-              <a:rPr lang="en-US" smtClean="0"/>
+              <a:rPr lang="en-US"/>
               <a:t>Edit Master text styles</a:t>
             </a:r>
           </a:p>
           <a:p>
             <a:pPr lvl="1"/>
             <a:r>
-              <a:rPr lang="en-US" smtClean="0"/>
+              <a:rPr lang="en-US"/>
               <a:t>Second level</a:t>
             </a:r>
           </a:p>
           <a:p>
             <a:pPr lvl="2"/>
             <a:r>
-              <a:rPr lang="en-US" smtClean="0"/>
+              <a:rPr lang="en-US"/>
               <a:t>Third level</a:t>
             </a:r>
           </a:p>
           <a:p>
             <a:pPr lvl="3"/>
             <a:r>
-              <a:rPr lang="en-US" smtClean="0"/>
+              <a:rPr lang="en-US"/>
               <a:t>Fourth level</a:t>
             </a:r>
           </a:p>
           <a:p>
             <a:pPr lvl="4"/>
             <a:r>
-              <a:rPr lang="en-US" smtClean="0"/>
+              <a:rPr lang="en-US"/>
               <a:t>Fifth level</a:t>
             </a:r>
             <a:endParaRPr lang="en-US" dirty="0"/>
@@ -3119,7 +3118,7 @@
           <a:lstStyle/>
           <a:p>
             <a:r>
-              <a:rPr lang="en-US" smtClean="0"/>
+              <a:rPr lang="en-US"/>
               <a:t>Click to edit Master title style</a:t>
             </a:r>
             <a:endParaRPr lang="en-US" dirty="0"/>
@@ -3148,35 +3147,35 @@
           <a:p>
             <a:pPr lvl="0"/>
             <a:r>
-              <a:rPr lang="en-US" smtClean="0"/>
+              <a:rPr lang="en-US"/>
               <a:t>Edit Master text styles</a:t>
             </a:r>
           </a:p>
           <a:p>
             <a:pPr lvl="1"/>
             <a:r>
-              <a:rPr lang="en-US" smtClean="0"/>
+              <a:rPr lang="en-US"/>
               <a:t>Second level</a:t>
             </a:r>
           </a:p>
           <a:p>
             <a:pPr lvl="2"/>
             <a:r>
-              <a:rPr lang="en-US" smtClean="0"/>
+              <a:rPr lang="en-US"/>
               <a:t>Third level</a:t>
             </a:r>
           </a:p>
           <a:p>
             <a:pPr lvl="3"/>
             <a:r>
-              <a:rPr lang="en-US" smtClean="0"/>
+              <a:rPr lang="en-US"/>
               <a:t>Fourth level</a:t>
             </a:r>
           </a:p>
           <a:p>
             <a:pPr lvl="4"/>
             <a:r>
-              <a:rPr lang="en-US" smtClean="0"/>
+              <a:rPr lang="en-US"/>
               <a:t>Fifth level</a:t>
             </a:r>
             <a:endParaRPr lang="en-US" dirty="0"/>
@@ -3294,7 +3293,7 @@
           <a:lstStyle/>
           <a:p>
             <a:r>
-              <a:rPr lang="en-US" smtClean="0"/>
+              <a:rPr lang="en-US"/>
               <a:t>Click to edit Master title style</a:t>
             </a:r>
             <a:endParaRPr lang="en-US" dirty="0"/>
@@ -3318,35 +3317,35 @@
           <a:p>
             <a:pPr lvl="0"/>
             <a:r>
-              <a:rPr lang="en-US" smtClean="0"/>
+              <a:rPr lang="en-US"/>
               <a:t>Edit Master text styles</a:t>
             </a:r>
           </a:p>
           <a:p>
             <a:pPr lvl="1"/>
             <a:r>
-              <a:rPr lang="en-US" smtClean="0"/>
+              <a:rPr lang="en-US"/>
               <a:t>Second level</a:t>
             </a:r>
           </a:p>
           <a:p>
             <a:pPr lvl="2"/>
             <a:r>
-              <a:rPr lang="en-US" smtClean="0"/>
+              <a:rPr lang="en-US"/>
               <a:t>Third level</a:t>
             </a:r>
           </a:p>
           <a:p>
             <a:pPr lvl="3"/>
             <a:r>
-              <a:rPr lang="en-US" smtClean="0"/>
+              <a:rPr lang="en-US"/>
               <a:t>Fourth level</a:t>
             </a:r>
           </a:p>
           <a:p>
             <a:pPr lvl="4"/>
             <a:r>
-              <a:rPr lang="en-US" smtClean="0"/>
+              <a:rPr lang="en-US"/>
               <a:t>Fifth level</a:t>
             </a:r>
             <a:endParaRPr lang="en-US" dirty="0"/>
@@ -3507,7 +3506,7 @@
           </a:lstStyle>
           <a:p>
             <a:r>
-              <a:rPr lang="en-US" smtClean="0"/>
+              <a:rPr lang="en-US"/>
               <a:t>Click to edit Master title style</a:t>
             </a:r>
             <a:endParaRPr lang="en-US" dirty="0"/>
@@ -3603,7 +3602,7 @@
           </a:lstStyle>
           <a:p>
             <a:r>
-              <a:rPr lang="en-US" smtClean="0"/>
+              <a:rPr lang="en-US"/>
               <a:t>Click to edit Master subtitle style</a:t>
             </a:r>
             <a:endParaRPr lang="en-US" dirty="0"/>
@@ -3721,7 +3720,7 @@
           <a:lstStyle/>
           <a:p>
             <a:r>
-              <a:rPr lang="en-US" smtClean="0"/>
+              <a:rPr lang="en-US"/>
               <a:t>Click to edit Master title style</a:t>
             </a:r>
             <a:endParaRPr lang="en-US" dirty="0"/>
@@ -3750,35 +3749,35 @@
           <a:p>
             <a:pPr lvl="0"/>
             <a:r>
-              <a:rPr lang="en-US" smtClean="0"/>
+              <a:rPr lang="en-US"/>
               <a:t>Edit Master text styles</a:t>
             </a:r>
           </a:p>
           <a:p>
             <a:pPr lvl="1"/>
             <a:r>
-              <a:rPr lang="en-US" smtClean="0"/>
+              <a:rPr lang="en-US"/>
               <a:t>Second level</a:t>
             </a:r>
           </a:p>
           <a:p>
             <a:pPr lvl="2"/>
             <a:r>
-              <a:rPr lang="en-US" smtClean="0"/>
+              <a:rPr lang="en-US"/>
               <a:t>Third level</a:t>
             </a:r>
           </a:p>
           <a:p>
             <a:pPr lvl="3"/>
             <a:r>
-              <a:rPr lang="en-US" smtClean="0"/>
+              <a:rPr lang="en-US"/>
               <a:t>Fourth level</a:t>
             </a:r>
           </a:p>
           <a:p>
             <a:pPr lvl="4"/>
             <a:r>
-              <a:rPr lang="en-US" smtClean="0"/>
+              <a:rPr lang="en-US"/>
               <a:t>Fifth level</a:t>
             </a:r>
             <a:endParaRPr lang="en-US" dirty="0"/>
@@ -3807,35 +3806,35 @@
           <a:p>
             <a:pPr lvl="0"/>
             <a:r>
-              <a:rPr lang="en-US" smtClean="0"/>
+              <a:rPr lang="en-US"/>
               <a:t>Edit Master text styles</a:t>
             </a:r>
           </a:p>
           <a:p>
             <a:pPr lvl="1"/>
             <a:r>
-              <a:rPr lang="en-US" smtClean="0"/>
+              <a:rPr lang="en-US"/>
               <a:t>Second level</a:t>
             </a:r>
           </a:p>
           <a:p>
             <a:pPr lvl="2"/>
             <a:r>
-              <a:rPr lang="en-US" smtClean="0"/>
+              <a:rPr lang="en-US"/>
               <a:t>Third level</a:t>
             </a:r>
           </a:p>
           <a:p>
             <a:pPr lvl="3"/>
             <a:r>
-              <a:rPr lang="en-US" smtClean="0"/>
+              <a:rPr lang="en-US"/>
               <a:t>Fourth level</a:t>
             </a:r>
           </a:p>
           <a:p>
             <a:pPr lvl="4"/>
             <a:r>
-              <a:rPr lang="en-US" smtClean="0"/>
+              <a:rPr lang="en-US"/>
               <a:t>Fifth level</a:t>
             </a:r>
             <a:endParaRPr lang="en-US" dirty="0"/>
@@ -3958,7 +3957,7 @@
           <a:lstStyle/>
           <a:p>
             <a:r>
-              <a:rPr lang="en-US" smtClean="0"/>
+              <a:rPr lang="en-US"/>
               <a:t>Click to edit Master title style</a:t>
             </a:r>
             <a:endParaRPr lang="en-US" dirty="0"/>
@@ -4051,7 +4050,7 @@
           <a:p>
             <a:pPr lvl="0"/>
             <a:r>
-              <a:rPr lang="en-US" smtClean="0"/>
+              <a:rPr lang="en-US"/>
               <a:t>Edit Master text styles</a:t>
             </a:r>
           </a:p>
@@ -4079,35 +4078,35 @@
           <a:p>
             <a:pPr lvl="0"/>
             <a:r>
-              <a:rPr lang="en-US" smtClean="0"/>
+              <a:rPr lang="en-US"/>
               <a:t>Edit Master text styles</a:t>
             </a:r>
           </a:p>
           <a:p>
             <a:pPr lvl="1"/>
             <a:r>
-              <a:rPr lang="en-US" smtClean="0"/>
+              <a:rPr lang="en-US"/>
               <a:t>Second level</a:t>
             </a:r>
           </a:p>
           <a:p>
             <a:pPr lvl="2"/>
             <a:r>
-              <a:rPr lang="en-US" smtClean="0"/>
+              <a:rPr lang="en-US"/>
               <a:t>Third level</a:t>
             </a:r>
           </a:p>
           <a:p>
             <a:pPr lvl="3"/>
             <a:r>
-              <a:rPr lang="en-US" smtClean="0"/>
+              <a:rPr lang="en-US"/>
               <a:t>Fourth level</a:t>
             </a:r>
           </a:p>
           <a:p>
             <a:pPr lvl="4"/>
             <a:r>
-              <a:rPr lang="en-US" smtClean="0"/>
+              <a:rPr lang="en-US"/>
               <a:t>Fifth level</a:t>
             </a:r>
             <a:endParaRPr lang="en-US" dirty="0"/>
@@ -4172,7 +4171,7 @@
               <a:buNone/>
             </a:pPr>
             <a:r>
-              <a:rPr lang="en-US" smtClean="0"/>
+              <a:rPr lang="en-US"/>
               <a:t>Edit Master text styles</a:t>
             </a:r>
           </a:p>
@@ -4200,35 +4199,35 @@
           <a:p>
             <a:pPr lvl="0"/>
             <a:r>
-              <a:rPr lang="en-US" smtClean="0"/>
+              <a:rPr lang="en-US"/>
               <a:t>Edit Master text styles</a:t>
             </a:r>
           </a:p>
           <a:p>
             <a:pPr lvl="1"/>
             <a:r>
-              <a:rPr lang="en-US" smtClean="0"/>
+              <a:rPr lang="en-US"/>
               <a:t>Second level</a:t>
             </a:r>
           </a:p>
           <a:p>
             <a:pPr lvl="2"/>
             <a:r>
-              <a:rPr lang="en-US" smtClean="0"/>
+              <a:rPr lang="en-US"/>
               <a:t>Third level</a:t>
             </a:r>
           </a:p>
           <a:p>
             <a:pPr lvl="3"/>
             <a:r>
-              <a:rPr lang="en-US" smtClean="0"/>
+              <a:rPr lang="en-US"/>
               <a:t>Fourth level</a:t>
             </a:r>
           </a:p>
           <a:p>
             <a:pPr lvl="4"/>
             <a:r>
-              <a:rPr lang="en-US" smtClean="0"/>
+              <a:rPr lang="en-US"/>
               <a:t>Fifth level</a:t>
             </a:r>
             <a:endParaRPr lang="en-US" dirty="0"/>
@@ -4346,7 +4345,7 @@
           <a:lstStyle/>
           <a:p>
             <a:r>
-              <a:rPr lang="en-US" smtClean="0"/>
+              <a:rPr lang="en-US"/>
               <a:t>Click to edit Master title style</a:t>
             </a:r>
             <a:endParaRPr lang="en-US" dirty="0"/>
@@ -4568,7 +4567,7 @@
           </a:lstStyle>
           <a:p>
             <a:r>
-              <a:rPr lang="en-US" smtClean="0"/>
+              <a:rPr lang="en-US"/>
               <a:t>Click to edit Master title style</a:t>
             </a:r>
             <a:endParaRPr lang="en-US" dirty="0"/>
@@ -4597,35 +4596,35 @@
           <a:p>
             <a:pPr lvl="0"/>
             <a:r>
-              <a:rPr lang="en-US" smtClean="0"/>
+              <a:rPr lang="en-US"/>
               <a:t>Edit Master text styles</a:t>
             </a:r>
           </a:p>
           <a:p>
             <a:pPr lvl="1"/>
             <a:r>
-              <a:rPr lang="en-US" smtClean="0"/>
+              <a:rPr lang="en-US"/>
               <a:t>Second level</a:t>
             </a:r>
           </a:p>
           <a:p>
             <a:pPr lvl="2"/>
             <a:r>
-              <a:rPr lang="en-US" smtClean="0"/>
+              <a:rPr lang="en-US"/>
               <a:t>Third level</a:t>
             </a:r>
           </a:p>
           <a:p>
             <a:pPr lvl="3"/>
             <a:r>
-              <a:rPr lang="en-US" smtClean="0"/>
+              <a:rPr lang="en-US"/>
               <a:t>Fourth level</a:t>
             </a:r>
           </a:p>
           <a:p>
             <a:pPr lvl="4"/>
             <a:r>
-              <a:rPr lang="en-US" smtClean="0"/>
+              <a:rPr lang="en-US"/>
               <a:t>Fifth level</a:t>
             </a:r>
             <a:endParaRPr lang="en-US" dirty="0"/>
@@ -4715,7 +4714,7 @@
           <a:p>
             <a:pPr lvl="0"/>
             <a:r>
-              <a:rPr lang="en-US" smtClean="0"/>
+              <a:rPr lang="en-US"/>
               <a:t>Edit Master text styles</a:t>
             </a:r>
           </a:p>
@@ -4841,7 +4840,7 @@
           </a:lstStyle>
           <a:p>
             <a:r>
-              <a:rPr lang="en-US" smtClean="0"/>
+              <a:rPr lang="en-US"/>
               <a:t>Click to edit Master title style</a:t>
             </a:r>
             <a:endParaRPr lang="en-US" dirty="0"/>
@@ -4906,7 +4905,7 @@
           </a:lstStyle>
           <a:p>
             <a:r>
-              <a:rPr lang="en-US" smtClean="0"/>
+              <a:rPr lang="en-US"/>
               <a:t>Click icon to add picture</a:t>
             </a:r>
             <a:endParaRPr lang="en-US" dirty="0"/>
@@ -4996,7 +4995,7 @@
           <a:p>
             <a:pPr lvl="0"/>
             <a:r>
-              <a:rPr lang="en-US" smtClean="0"/>
+              <a:rPr lang="en-US"/>
               <a:t>Edit Master text styles</a:t>
             </a:r>
           </a:p>
@@ -5137,7 +5136,7 @@
           <a:lstStyle/>
           <a:p>
             <a:r>
-              <a:rPr lang="en-US" smtClean="0"/>
+              <a:rPr lang="en-US"/>
               <a:t>Click to edit Master title style</a:t>
             </a:r>
             <a:endParaRPr lang="en-US" dirty="0"/>
@@ -5171,35 +5170,35 @@
           <a:p>
             <a:pPr lvl="0"/>
             <a:r>
-              <a:rPr lang="en-US" smtClean="0"/>
+              <a:rPr lang="en-US"/>
               <a:t>Edit Master text styles</a:t>
             </a:r>
           </a:p>
           <a:p>
             <a:pPr lvl="1"/>
             <a:r>
-              <a:rPr lang="en-US" smtClean="0"/>
+              <a:rPr lang="en-US"/>
               <a:t>Second level</a:t>
             </a:r>
           </a:p>
           <a:p>
             <a:pPr lvl="2"/>
             <a:r>
-              <a:rPr lang="en-US" smtClean="0"/>
+              <a:rPr lang="en-US"/>
               <a:t>Third level</a:t>
             </a:r>
           </a:p>
           <a:p>
             <a:pPr lvl="3"/>
             <a:r>
-              <a:rPr lang="en-US" smtClean="0"/>
+              <a:rPr lang="en-US"/>
               <a:t>Fourth level</a:t>
             </a:r>
           </a:p>
           <a:p>
             <a:pPr lvl="4"/>
             <a:r>
-              <a:rPr lang="en-US" smtClean="0"/>
+              <a:rPr lang="en-US"/>
               <a:t>Fifth level</a:t>
             </a:r>
             <a:endParaRPr lang="en-US" dirty="0"/>
@@ -5842,10 +5841,9 @@
           <a:lstStyle/>
           <a:p>
             <a:r>
-              <a:rPr lang="en-US" dirty="0" smtClean="0"/>
+              <a:rPr lang="en-US" dirty="0"/>
               <a:t>Employee of the month</a:t>
             </a:r>
-            <a:endParaRPr lang="en-US" dirty="0"/>
           </a:p>
         </p:txBody>
       </p:sp>
@@ -5870,11 +5868,11 @@
           <a:lstStyle/>
           <a:p>
             <a:r>
-              <a:rPr lang="en-US" dirty="0" smtClean="0"/>
+              <a:rPr lang="en-US" dirty="0"/>
               <a:t>Team </a:t>
             </a:r>
             <a:r>
-              <a:rPr lang="en-US" dirty="0" err="1" smtClean="0"/>
+              <a:rPr lang="en-US" dirty="0" err="1"/>
               <a:t>ZaFe</a:t>
             </a:r>
             <a:endParaRPr lang="en-US" dirty="0"/>
@@ -5891,13 +5889,6 @@
   <p:clrMapOvr>
     <a:masterClrMapping/>
   </p:clrMapOvr>
-  <p:timing>
-    <p:tnLst>
-      <p:par>
-        <p:cTn id="1" dur="indefinite" restart="never" nodeType="tmRoot"/>
-      </p:par>
-    </p:tnLst>
-  </p:timing>
 </p:sld>
 </file>
 
@@ -5928,175 +5919,15 @@
             <p:ph type="title"/>
           </p:nvPr>
         </p:nvSpPr>
-        <p:spPr>
-          <a:xfrm>
-            <a:off x="788323" y="1329402"/>
-            <a:ext cx="10515600" cy="1325563"/>
-          </a:xfrm>
-        </p:spPr>
-        <p:txBody>
-          <a:bodyPr/>
-          <a:lstStyle/>
-          <a:p>
-            <a:pPr algn="ctr"/>
-            <a:r>
-              <a:rPr lang="en-US" dirty="0" smtClean="0"/>
-              <a:t>Content</a:t>
-            </a:r>
-            <a:endParaRPr lang="en-US" dirty="0"/>
-          </a:p>
-        </p:txBody>
-      </p:sp>
-      <p:sp>
-        <p:nvSpPr>
-          <p:cNvPr id="3" name="TextBox 2"/>
-          <p:cNvSpPr txBox="1"/>
-          <p:nvPr/>
-        </p:nvSpPr>
-        <p:spPr>
-          <a:xfrm>
-            <a:off x="5353397" y="2834642"/>
-            <a:ext cx="1404850" cy="369332"/>
-          </a:xfrm>
-          <a:prstGeom prst="rect">
-            <a:avLst/>
-          </a:prstGeom>
-          <a:noFill/>
-        </p:spPr>
-        <p:txBody>
-          <a:bodyPr wrap="square" rtlCol="0">
-            <a:spAutoFit/>
-          </a:bodyPr>
-          <a:lstStyle/>
-          <a:p>
-            <a:pPr algn="ctr"/>
-            <a:r>
-              <a:rPr lang="en-US" dirty="0" smtClean="0"/>
-              <a:t>1. Our team</a:t>
-            </a:r>
-            <a:endParaRPr lang="en-US" dirty="0"/>
-          </a:p>
-        </p:txBody>
-      </p:sp>
-      <p:sp>
-        <p:nvSpPr>
-          <p:cNvPr id="4" name="TextBox 3"/>
-          <p:cNvSpPr txBox="1"/>
-          <p:nvPr/>
-        </p:nvSpPr>
-        <p:spPr>
-          <a:xfrm>
-            <a:off x="4912823" y="3433158"/>
-            <a:ext cx="2327563" cy="369332"/>
-          </a:xfrm>
-          <a:prstGeom prst="rect">
-            <a:avLst/>
-          </a:prstGeom>
-          <a:noFill/>
-        </p:spPr>
-        <p:txBody>
-          <a:bodyPr wrap="square" rtlCol="0">
-            <a:spAutoFit/>
-          </a:bodyPr>
-          <a:lstStyle/>
-          <a:p>
-            <a:pPr algn="ctr"/>
-            <a:r>
-              <a:rPr lang="en-US" dirty="0" smtClean="0"/>
-              <a:t>2.About the project</a:t>
-            </a:r>
-            <a:endParaRPr lang="en-US" dirty="0"/>
-          </a:p>
-        </p:txBody>
-      </p:sp>
-      <p:sp>
-        <p:nvSpPr>
-          <p:cNvPr id="6" name="TextBox 5"/>
-          <p:cNvSpPr txBox="1"/>
-          <p:nvPr/>
-        </p:nvSpPr>
-        <p:spPr>
-          <a:xfrm>
-            <a:off x="4987636" y="4031674"/>
-            <a:ext cx="2219499" cy="369332"/>
-          </a:xfrm>
-          <a:prstGeom prst="rect">
-            <a:avLst/>
-          </a:prstGeom>
-          <a:noFill/>
-        </p:spPr>
-        <p:txBody>
-          <a:bodyPr wrap="square" rtlCol="0">
-            <a:spAutoFit/>
-          </a:bodyPr>
-          <a:lstStyle/>
-          <a:p>
-            <a:pPr algn="ctr"/>
-            <a:r>
-              <a:rPr lang="en-US" dirty="0" smtClean="0"/>
-              <a:t>3.Used technologies</a:t>
-            </a:r>
-            <a:endParaRPr lang="en-US" dirty="0"/>
-          </a:p>
-        </p:txBody>
-      </p:sp>
-    </p:spTree>
-    <p:extLst>
-      <p:ext uri="{BB962C8B-B14F-4D97-AF65-F5344CB8AC3E}">
-        <p14:creationId xmlns:p14="http://schemas.microsoft.com/office/powerpoint/2010/main" val="212513438"/>
-      </p:ext>
-    </p:extLst>
-  </p:cSld>
-  <p:clrMapOvr>
-    <a:masterClrMapping/>
-  </p:clrMapOvr>
-  <p:timing>
-    <p:tnLst>
-      <p:par>
-        <p:cTn id="1" dur="indefinite" restart="never" nodeType="tmRoot"/>
-      </p:par>
-    </p:tnLst>
-  </p:timing>
-</p:sld>
-</file>
-
-<file path=ppt/slides/slide3.xml><?xml version="1.0" encoding="utf-8"?>
-<p:sld xmlns:a="http://schemas.openxmlformats.org/drawingml/2006/main" xmlns:r="http://schemas.openxmlformats.org/officeDocument/2006/relationships" xmlns:p="http://schemas.openxmlformats.org/presentationml/2006/main">
-  <p:cSld>
-    <p:spTree>
-      <p:nvGrpSpPr>
-        <p:cNvPr id="1" name=""/>
-        <p:cNvGrpSpPr/>
-        <p:nvPr/>
-      </p:nvGrpSpPr>
-      <p:grpSpPr>
-        <a:xfrm>
-          <a:off x="0" y="0"/>
-          <a:ext cx="0" cy="0"/>
-          <a:chOff x="0" y="0"/>
-          <a:chExt cx="0" cy="0"/>
-        </a:xfrm>
-      </p:grpSpPr>
-      <p:sp>
-        <p:nvSpPr>
-          <p:cNvPr id="2" name="Title 1"/>
-          <p:cNvSpPr>
-            <a:spLocks noGrp="1"/>
-          </p:cNvSpPr>
-          <p:nvPr>
-            <p:ph type="title"/>
-          </p:nvPr>
-        </p:nvSpPr>
         <p:spPr/>
         <p:txBody>
           <a:bodyPr/>
           <a:lstStyle/>
           <a:p>
             <a:r>
-              <a:rPr lang="en-US" dirty="0" smtClean="0"/>
+              <a:rPr lang="en-US" dirty="0"/>
               <a:t>Our Team</a:t>
             </a:r>
-            <a:endParaRPr lang="en-US" dirty="0"/>
           </a:p>
         </p:txBody>
       </p:sp>
@@ -6127,25 +5958,25 @@
               <a:buChar char="•"/>
             </a:pPr>
             <a:r>
-              <a:rPr lang="en-US" dirty="0" err="1" smtClean="0"/>
+              <a:rPr lang="en-US" dirty="0" err="1"/>
               <a:t>Ilian</a:t>
             </a:r>
             <a:r>
-              <a:rPr lang="en-US" dirty="0" smtClean="0"/>
+              <a:rPr lang="en-US" dirty="0"/>
               <a:t> </a:t>
             </a:r>
             <a:r>
-              <a:rPr lang="en-US" dirty="0" err="1" smtClean="0"/>
+              <a:rPr lang="en-US" dirty="0" err="1"/>
               <a:t>Yanev</a:t>
             </a:r>
             <a:r>
-              <a:rPr lang="en-US" dirty="0" smtClean="0"/>
+              <a:rPr lang="en-US" dirty="0"/>
               <a:t> – Front-end &amp; Database developer, Scrum Master, Documentary</a:t>
             </a:r>
           </a:p>
           <a:p>
             <a:r>
-              <a:rPr lang="en-US" dirty="0" smtClean="0"/>
+              <a:rPr lang="en-US" dirty="0"/>
               <a:t>IMYanev18@codingburgas.bg</a:t>
             </a:r>
           </a:p>
@@ -6158,28 +5989,27 @@
               <a:buChar char="•"/>
             </a:pPr>
             <a:r>
-              <a:rPr lang="en-US" dirty="0" err="1" smtClean="0"/>
+              <a:rPr lang="en-US" dirty="0" err="1"/>
               <a:t>Petar</a:t>
             </a:r>
             <a:r>
-              <a:rPr lang="en-US" dirty="0" smtClean="0"/>
+              <a:rPr lang="en-US" dirty="0"/>
               <a:t> </a:t>
             </a:r>
             <a:r>
-              <a:rPr lang="en-US" dirty="0" err="1" smtClean="0"/>
+              <a:rPr lang="en-US" dirty="0" err="1"/>
               <a:t>Borisov</a:t>
             </a:r>
             <a:r>
-              <a:rPr lang="en-US" dirty="0" smtClean="0"/>
+              <a:rPr lang="en-US" dirty="0"/>
               <a:t> – Back-end &amp; Database developer, Documentary </a:t>
             </a:r>
           </a:p>
           <a:p>
             <a:r>
-              <a:rPr lang="en-US" dirty="0" smtClean="0"/>
+              <a:rPr lang="en-US" dirty="0"/>
               <a:t>PBBorisov18@codingburgas.bg</a:t>
             </a:r>
-            <a:endParaRPr lang="en-US" dirty="0"/>
           </a:p>
         </p:txBody>
       </p:sp>
@@ -6305,17 +6135,10 @@
   <p:clrMapOvr>
     <a:masterClrMapping/>
   </p:clrMapOvr>
-  <p:timing>
-    <p:tnLst>
-      <p:par>
-        <p:cTn id="1" dur="indefinite" restart="never" nodeType="tmRoot"/>
-      </p:par>
-    </p:tnLst>
-  </p:timing>
 </p:sld>
 </file>
 
-<file path=ppt/slides/slide4.xml><?xml version="1.0" encoding="utf-8"?>
+<file path=ppt/slides/slide3.xml><?xml version="1.0" encoding="utf-8"?>
 <p:sld xmlns:a="http://schemas.openxmlformats.org/drawingml/2006/main" xmlns:r="http://schemas.openxmlformats.org/officeDocument/2006/relationships" xmlns:p="http://schemas.openxmlformats.org/presentationml/2006/main">
   <p:cSld>
     <p:spTree>
@@ -6348,10 +6171,9 @@
           <a:lstStyle/>
           <a:p>
             <a:r>
-              <a:rPr lang="en-US" dirty="0" smtClean="0"/>
+              <a:rPr lang="en-US" dirty="0"/>
               <a:t>About the project</a:t>
             </a:r>
-            <a:endParaRPr lang="en-US" dirty="0"/>
           </a:p>
         </p:txBody>
       </p:sp>
@@ -6378,12 +6200,8 @@
           <a:lstStyle/>
           <a:p>
             <a:r>
-              <a:rPr lang="en-US" dirty="0" smtClean="0"/>
-              <a:t>The project is Employee of the month. When you run the project you will be given a menu with </a:t>
-            </a:r>
-            <a:r>
               <a:rPr lang="en-US" dirty="0"/>
-              <a:t>3 options: Vote, Check prizes, FAQ. If you click the vote button you will be given a dropdown menu with all the workers for which you can vote for. When you choose your </a:t>
+              <a:t>The project is Employee of the month. When you run the project you will be given a menu with 3 options: Vote, Check prizes, FAQ. If you click the vote button you will be given a dropdown menu with all the workers for which you can vote for. When you choose your </a:t>
             </a:r>
             <a:r>
               <a:rPr lang="en-US" dirty="0" err="1"/>
@@ -6399,25 +6217,8 @@
             </a:r>
             <a:r>
               <a:rPr lang="en-US" dirty="0"/>
-              <a:t>. The </a:t>
-            </a:r>
-            <a:r>
-              <a:rPr lang="en-US" dirty="0" err="1"/>
-              <a:t>thord</a:t>
-            </a:r>
-            <a:r>
-              <a:rPr lang="en-US" dirty="0"/>
-              <a:t> option (FAQ) is pretty simple. When you click it, you are given a list with some of the questions that are </a:t>
-            </a:r>
-            <a:r>
-              <a:rPr lang="en-US" dirty="0" err="1"/>
-              <a:t>oftenly</a:t>
-            </a:r>
-            <a:r>
-              <a:rPr lang="en-US" dirty="0"/>
-              <a:t> asked.</a:t>
-            </a:r>
-            <a:endParaRPr lang="en-US" dirty="0"/>
+              <a:t>. The third option (FAQ) is pretty simple. When you click it, you are given a list with some frequently asked questions and their answer.</a:t>
+            </a:r>
           </a:p>
         </p:txBody>
       </p:sp>
@@ -6538,17 +6339,10 @@
   <p:clrMapOvr>
     <a:masterClrMapping/>
   </p:clrMapOvr>
-  <p:timing>
-    <p:tnLst>
-      <p:par>
-        <p:cTn id="1" dur="indefinite" restart="never" nodeType="tmRoot"/>
-      </p:par>
-    </p:tnLst>
-  </p:timing>
 </p:sld>
 </file>
 
-<file path=ppt/slides/slide5.xml><?xml version="1.0" encoding="utf-8"?>
+<file path=ppt/slides/slide4.xml><?xml version="1.0" encoding="utf-8"?>
 <p:sld xmlns:a="http://schemas.openxmlformats.org/drawingml/2006/main" xmlns:r="http://schemas.openxmlformats.org/officeDocument/2006/relationships" xmlns:p="http://schemas.openxmlformats.org/presentationml/2006/main">
   <p:cSld>
     <p:spTree>
@@ -6619,10 +6413,9 @@
           <a:lstStyle/>
           <a:p>
             <a:r>
-              <a:rPr lang="en-US" dirty="0" smtClean="0"/>
+              <a:rPr lang="en-US" dirty="0"/>
               <a:t>Used technologies</a:t>
             </a:r>
-            <a:endParaRPr lang="en-US" dirty="0"/>
           </a:p>
         </p:txBody>
       </p:sp>
@@ -6917,17 +6710,10 @@
   <p:clrMapOvr>
     <a:masterClrMapping/>
   </p:clrMapOvr>
-  <p:timing>
-    <p:tnLst>
-      <p:par>
-        <p:cTn id="1" dur="indefinite" restart="never" nodeType="tmRoot"/>
-      </p:par>
-    </p:tnLst>
-  </p:timing>
 </p:sld>
 </file>
 
-<file path=ppt/slides/slide6.xml><?xml version="1.0" encoding="utf-8"?>
+<file path=ppt/slides/slide5.xml><?xml version="1.0" encoding="utf-8"?>
 <p:sld xmlns:a="http://schemas.openxmlformats.org/drawingml/2006/main" xmlns:r="http://schemas.openxmlformats.org/officeDocument/2006/relationships" xmlns:p="http://schemas.openxmlformats.org/presentationml/2006/main">
   <p:cSld>
     <p:spTree>
@@ -6968,10 +6754,9 @@
           <a:p>
             <a:pPr algn="ctr"/>
             <a:r>
-              <a:rPr lang="en-US" dirty="0" smtClean="0"/>
+              <a:rPr lang="en-US" dirty="0"/>
               <a:t>Thank you for the attention!</a:t>
             </a:r>
-            <a:endParaRPr lang="en-US" dirty="0"/>
           </a:p>
         </p:txBody>
       </p:sp>
@@ -6985,13 +6770,6 @@
   <p:clrMapOvr>
     <a:masterClrMapping/>
   </p:clrMapOvr>
-  <p:timing>
-    <p:tnLst>
-      <p:par>
-        <p:cTn id="1" dur="indefinite" restart="never" nodeType="tmRoot"/>
-      </p:par>
-    </p:tnLst>
-  </p:timing>
 </p:sld>
 </file>
 

</xml_diff>